<commit_message>
finishing the SOLID presentation
</commit_message>
<xml_diff>
--- a/Software test workshop.pptx
+++ b/Software test workshop.pptx
@@ -1534,6 +1534,10 @@
           <a:bodyPr/>
           <a:lstStyle/>
           <a:p>
+            <a:r>
+              <a:rPr lang="pt-BR" dirty="0"/>
+              <a:t>Abstract without implement. You can use dependency INJECTION (a code strategy) in order to implement the dependency INVERSION (an architectural design) principle</a:t>
+            </a:r>
             <a:endParaRPr lang="en-CA" dirty="0"/>
           </a:p>
         </p:txBody>
@@ -8525,8 +8529,8 @@
         </p:nvSpPr>
         <p:spPr bwMode="auto">
           <a:xfrm>
-            <a:off x="5736920" y="2329840"/>
-            <a:ext cx="5966143" cy="2417523"/>
+            <a:off x="5736920" y="1874951"/>
+            <a:ext cx="5966143" cy="3108097"/>
           </a:xfrm>
           <a:prstGeom prst="rect">
             <a:avLst/>
@@ -8719,7 +8723,7 @@
             </a:pPr>
             <a:r>
               <a:rPr lang="pt-BR" dirty="0"/>
-              <a:t>“A class should have one, and only one, reason to change”</a:t>
+              <a:t>“High-level modules should not depend on low-level modules. Both should depend on abstractions. Abstractions should not depend on details. Details should depend on abstractions.”</a:t>
             </a:r>
           </a:p>
         </p:txBody>

</xml_diff>